<commit_message>
update lcps with canopy height adjustment
</commit_message>
<xml_diff>
--- a/Figures/Figure_studio.pptx
+++ b/Figures/Figure_studio.pptx
@@ -261,7 +261,7 @@
           <a:p>
             <a:fld id="{CD48A445-E91F-4F3C-B20C-709616792687}" type="datetimeFigureOut">
               <a:rPr lang="en-US" smtClean="0"/>
-              <a:t>11/28/2023</a:t>
+              <a:t>12/4/2023</a:t>
             </a:fld>
             <a:endParaRPr lang="en-US"/>
           </a:p>
@@ -459,7 +459,7 @@
           <a:p>
             <a:fld id="{CD48A445-E91F-4F3C-B20C-709616792687}" type="datetimeFigureOut">
               <a:rPr lang="en-US" smtClean="0"/>
-              <a:t>11/28/2023</a:t>
+              <a:t>12/4/2023</a:t>
             </a:fld>
             <a:endParaRPr lang="en-US"/>
           </a:p>
@@ -667,7 +667,7 @@
           <a:p>
             <a:fld id="{CD48A445-E91F-4F3C-B20C-709616792687}" type="datetimeFigureOut">
               <a:rPr lang="en-US" smtClean="0"/>
-              <a:t>11/28/2023</a:t>
+              <a:t>12/4/2023</a:t>
             </a:fld>
             <a:endParaRPr lang="en-US"/>
           </a:p>
@@ -865,7 +865,7 @@
           <a:p>
             <a:fld id="{CD48A445-E91F-4F3C-B20C-709616792687}" type="datetimeFigureOut">
               <a:rPr lang="en-US" smtClean="0"/>
-              <a:t>11/28/2023</a:t>
+              <a:t>12/4/2023</a:t>
             </a:fld>
             <a:endParaRPr lang="en-US"/>
           </a:p>
@@ -1140,7 +1140,7 @@
           <a:p>
             <a:fld id="{CD48A445-E91F-4F3C-B20C-709616792687}" type="datetimeFigureOut">
               <a:rPr lang="en-US" smtClean="0"/>
-              <a:t>11/28/2023</a:t>
+              <a:t>12/4/2023</a:t>
             </a:fld>
             <a:endParaRPr lang="en-US"/>
           </a:p>
@@ -1405,7 +1405,7 @@
           <a:p>
             <a:fld id="{CD48A445-E91F-4F3C-B20C-709616792687}" type="datetimeFigureOut">
               <a:rPr lang="en-US" smtClean="0"/>
-              <a:t>11/28/2023</a:t>
+              <a:t>12/4/2023</a:t>
             </a:fld>
             <a:endParaRPr lang="en-US"/>
           </a:p>
@@ -1817,7 +1817,7 @@
           <a:p>
             <a:fld id="{CD48A445-E91F-4F3C-B20C-709616792687}" type="datetimeFigureOut">
               <a:rPr lang="en-US" smtClean="0"/>
-              <a:t>11/28/2023</a:t>
+              <a:t>12/4/2023</a:t>
             </a:fld>
             <a:endParaRPr lang="en-US"/>
           </a:p>
@@ -1958,7 +1958,7 @@
           <a:p>
             <a:fld id="{CD48A445-E91F-4F3C-B20C-709616792687}" type="datetimeFigureOut">
               <a:rPr lang="en-US" smtClean="0"/>
-              <a:t>11/28/2023</a:t>
+              <a:t>12/4/2023</a:t>
             </a:fld>
             <a:endParaRPr lang="en-US"/>
           </a:p>
@@ -2071,7 +2071,7 @@
           <a:p>
             <a:fld id="{CD48A445-E91F-4F3C-B20C-709616792687}" type="datetimeFigureOut">
               <a:rPr lang="en-US" smtClean="0"/>
-              <a:t>11/28/2023</a:t>
+              <a:t>12/4/2023</a:t>
             </a:fld>
             <a:endParaRPr lang="en-US"/>
           </a:p>
@@ -2382,7 +2382,7 @@
           <a:p>
             <a:fld id="{CD48A445-E91F-4F3C-B20C-709616792687}" type="datetimeFigureOut">
               <a:rPr lang="en-US" smtClean="0"/>
-              <a:t>11/28/2023</a:t>
+              <a:t>12/4/2023</a:t>
             </a:fld>
             <a:endParaRPr lang="en-US"/>
           </a:p>
@@ -2670,7 +2670,7 @@
           <a:p>
             <a:fld id="{CD48A445-E91F-4F3C-B20C-709616792687}" type="datetimeFigureOut">
               <a:rPr lang="en-US" smtClean="0"/>
-              <a:t>11/28/2023</a:t>
+              <a:t>12/4/2023</a:t>
             </a:fld>
             <a:endParaRPr lang="en-US"/>
           </a:p>
@@ -2911,7 +2911,7 @@
           <a:p>
             <a:fld id="{CD48A445-E91F-4F3C-B20C-709616792687}" type="datetimeFigureOut">
               <a:rPr lang="en-US" smtClean="0"/>
-              <a:t>11/28/2023</a:t>
+              <a:t>12/4/2023</a:t>
             </a:fld>
             <a:endParaRPr lang="en-US"/>
           </a:p>
@@ -3330,10 +3330,10 @@
       </p:grpSpPr>
       <p:pic>
         <p:nvPicPr>
-          <p:cNvPr id="6" name="Picture 5">
-            <a:extLst>
-              <a:ext uri="{FF2B5EF4-FFF2-40B4-BE49-F238E27FC236}">
-                <a16:creationId xmlns:a16="http://schemas.microsoft.com/office/drawing/2014/main" id="{4C96F61A-FEC4-2084-2218-EC1A922B6188}"/>
+          <p:cNvPr id="3" name="Picture 2">
+            <a:extLst>
+              <a:ext uri="{FF2B5EF4-FFF2-40B4-BE49-F238E27FC236}">
+                <a16:creationId xmlns:a16="http://schemas.microsoft.com/office/drawing/2014/main" id="{D7D4488C-E254-B5CF-FB05-F64E68CFC95F}"/>
               </a:ext>
             </a:extLst>
           </p:cNvPr>
@@ -3362,9 +3362,6 @@
           <a:prstGeom prst="rect">
             <a:avLst/>
           </a:prstGeom>
-          <a:ln>
-            <a:noFill/>
-          </a:ln>
         </p:spPr>
       </p:pic>
       <p:pic>
@@ -4048,10 +4045,10 @@
       </p:grpSpPr>
       <p:pic>
         <p:nvPicPr>
-          <p:cNvPr id="12" name="Picture 11">
-            <a:extLst>
-              <a:ext uri="{FF2B5EF4-FFF2-40B4-BE49-F238E27FC236}">
-                <a16:creationId xmlns:a16="http://schemas.microsoft.com/office/drawing/2014/main" id="{944CCCBD-892F-5BB9-074D-2628C201C2E2}"/>
+          <p:cNvPr id="7" name="Picture 6">
+            <a:extLst>
+              <a:ext uri="{FF2B5EF4-FFF2-40B4-BE49-F238E27FC236}">
+                <a16:creationId xmlns:a16="http://schemas.microsoft.com/office/drawing/2014/main" id="{1A416377-63E4-3686-8D3A-3994C2D021A2}"/>
               </a:ext>
             </a:extLst>
           </p:cNvPr>
@@ -4088,10 +4085,10 @@
       </p:pic>
       <p:pic>
         <p:nvPicPr>
-          <p:cNvPr id="10" name="Picture 9">
-            <a:extLst>
-              <a:ext uri="{FF2B5EF4-FFF2-40B4-BE49-F238E27FC236}">
-                <a16:creationId xmlns:a16="http://schemas.microsoft.com/office/drawing/2014/main" id="{F2306B22-6C42-8936-405D-4F3649745D12}"/>
+          <p:cNvPr id="5" name="Picture 4">
+            <a:extLst>
+              <a:ext uri="{FF2B5EF4-FFF2-40B4-BE49-F238E27FC236}">
+                <a16:creationId xmlns:a16="http://schemas.microsoft.com/office/drawing/2014/main" id="{50EBA1A3-44AC-1BD1-8E87-82981ABC4A73}"/>
               </a:ext>
             </a:extLst>
           </p:cNvPr>

</xml_diff>